<commit_message>
Agregados los diferentes puntos y mejorado el inicio antes del juego a un subgrupo.
</commit_message>
<xml_diff>
--- a/images/tacoPresentation.pptx
+++ b/images/tacoPresentation.pptx
@@ -243,7 +243,7 @@
           <a:p>
             <a:fld id="{63FAAA8C-C4B7-46F2-85D6-06B7FA52F59C}" type="datetimeFigureOut">
               <a:rPr lang="es-MX" smtClean="0"/>
-              <a:t>22/08/2015</a:t>
+              <a:t>27/08/2015</a:t>
             </a:fld>
             <a:endParaRPr lang="es-MX"/>
           </a:p>
@@ -413,7 +413,7 @@
           <a:p>
             <a:fld id="{63FAAA8C-C4B7-46F2-85D6-06B7FA52F59C}" type="datetimeFigureOut">
               <a:rPr lang="es-MX" smtClean="0"/>
-              <a:t>22/08/2015</a:t>
+              <a:t>27/08/2015</a:t>
             </a:fld>
             <a:endParaRPr lang="es-MX"/>
           </a:p>
@@ -593,7 +593,7 @@
           <a:p>
             <a:fld id="{63FAAA8C-C4B7-46F2-85D6-06B7FA52F59C}" type="datetimeFigureOut">
               <a:rPr lang="es-MX" smtClean="0"/>
-              <a:t>22/08/2015</a:t>
+              <a:t>27/08/2015</a:t>
             </a:fld>
             <a:endParaRPr lang="es-MX"/>
           </a:p>
@@ -763,7 +763,7 @@
           <a:p>
             <a:fld id="{63FAAA8C-C4B7-46F2-85D6-06B7FA52F59C}" type="datetimeFigureOut">
               <a:rPr lang="es-MX" smtClean="0"/>
-              <a:t>22/08/2015</a:t>
+              <a:t>27/08/2015</a:t>
             </a:fld>
             <a:endParaRPr lang="es-MX"/>
           </a:p>
@@ -1009,7 +1009,7 @@
           <a:p>
             <a:fld id="{63FAAA8C-C4B7-46F2-85D6-06B7FA52F59C}" type="datetimeFigureOut">
               <a:rPr lang="es-MX" smtClean="0"/>
-              <a:t>22/08/2015</a:t>
+              <a:t>27/08/2015</a:t>
             </a:fld>
             <a:endParaRPr lang="es-MX"/>
           </a:p>
@@ -1241,7 +1241,7 @@
           <a:p>
             <a:fld id="{63FAAA8C-C4B7-46F2-85D6-06B7FA52F59C}" type="datetimeFigureOut">
               <a:rPr lang="es-MX" smtClean="0"/>
-              <a:t>22/08/2015</a:t>
+              <a:t>27/08/2015</a:t>
             </a:fld>
             <a:endParaRPr lang="es-MX"/>
           </a:p>
@@ -1608,7 +1608,7 @@
           <a:p>
             <a:fld id="{63FAAA8C-C4B7-46F2-85D6-06B7FA52F59C}" type="datetimeFigureOut">
               <a:rPr lang="es-MX" smtClean="0"/>
-              <a:t>22/08/2015</a:t>
+              <a:t>27/08/2015</a:t>
             </a:fld>
             <a:endParaRPr lang="es-MX"/>
           </a:p>
@@ -1726,7 +1726,7 @@
           <a:p>
             <a:fld id="{63FAAA8C-C4B7-46F2-85D6-06B7FA52F59C}" type="datetimeFigureOut">
               <a:rPr lang="es-MX" smtClean="0"/>
-              <a:t>22/08/2015</a:t>
+              <a:t>27/08/2015</a:t>
             </a:fld>
             <a:endParaRPr lang="es-MX"/>
           </a:p>
@@ -1821,7 +1821,7 @@
           <a:p>
             <a:fld id="{63FAAA8C-C4B7-46F2-85D6-06B7FA52F59C}" type="datetimeFigureOut">
               <a:rPr lang="es-MX" smtClean="0"/>
-              <a:t>22/08/2015</a:t>
+              <a:t>27/08/2015</a:t>
             </a:fld>
             <a:endParaRPr lang="es-MX"/>
           </a:p>
@@ -2098,7 +2098,7 @@
           <a:p>
             <a:fld id="{63FAAA8C-C4B7-46F2-85D6-06B7FA52F59C}" type="datetimeFigureOut">
               <a:rPr lang="es-MX" smtClean="0"/>
-              <a:t>22/08/2015</a:t>
+              <a:t>27/08/2015</a:t>
             </a:fld>
             <a:endParaRPr lang="es-MX"/>
           </a:p>
@@ -2351,7 +2351,7 @@
           <a:p>
             <a:fld id="{63FAAA8C-C4B7-46F2-85D6-06B7FA52F59C}" type="datetimeFigureOut">
               <a:rPr lang="es-MX" smtClean="0"/>
-              <a:t>22/08/2015</a:t>
+              <a:t>27/08/2015</a:t>
             </a:fld>
             <a:endParaRPr lang="es-MX"/>
           </a:p>
@@ -2564,7 +2564,7 @@
           <a:p>
             <a:fld id="{63FAAA8C-C4B7-46F2-85D6-06B7FA52F59C}" type="datetimeFigureOut">
               <a:rPr lang="es-MX" smtClean="0"/>
-              <a:t>22/08/2015</a:t>
+              <a:t>27/08/2015</a:t>
             </a:fld>
             <a:endParaRPr lang="es-MX"/>
           </a:p>
@@ -3237,6 +3237,321 @@
           </a:prstGeom>
         </p:spPr>
       </p:pic>
+      <p:grpSp>
+        <p:nvGrpSpPr>
+          <p:cNvPr id="20" name="Grupo 19"/>
+          <p:cNvGrpSpPr/>
+          <p:nvPr/>
+        </p:nvGrpSpPr>
+        <p:grpSpPr>
+          <a:xfrm>
+            <a:off x="4206166" y="578717"/>
+            <a:ext cx="3671963" cy="542616"/>
+            <a:chOff x="4206166" y="578717"/>
+            <a:chExt cx="3671963" cy="542616"/>
+          </a:xfrm>
+        </p:grpSpPr>
+        <p:grpSp>
+          <p:nvGrpSpPr>
+            <p:cNvPr id="14" name="Grupo 13"/>
+            <p:cNvGrpSpPr/>
+            <p:nvPr/>
+          </p:nvGrpSpPr>
+          <p:grpSpPr>
+            <a:xfrm>
+              <a:off x="4206166" y="598113"/>
+              <a:ext cx="769062" cy="523220"/>
+              <a:chOff x="4276964" y="598113"/>
+              <a:chExt cx="769062" cy="523220"/>
+            </a:xfrm>
+          </p:grpSpPr>
+          <p:pic>
+            <p:nvPicPr>
+              <p:cNvPr id="3" name="Imagen 2"/>
+              <p:cNvPicPr>
+                <a:picLocks noChangeAspect="1"/>
+              </p:cNvPicPr>
+              <p:nvPr/>
+            </p:nvPicPr>
+            <p:blipFill>
+              <a:blip r:embed="rId8" cstate="print">
+                <a:extLst>
+                  <a:ext uri="{28A0092B-C50C-407E-A947-70E740481C1C}">
+                    <a14:useLocalDpi xmlns:a14="http://schemas.microsoft.com/office/drawing/2010/main" val="0"/>
+                  </a:ext>
+                </a:extLst>
+              </a:blip>
+              <a:stretch>
+                <a:fillRect/>
+              </a:stretch>
+            </p:blipFill>
+            <p:spPr>
+              <a:xfrm>
+                <a:off x="4276964" y="617509"/>
+                <a:ext cx="140365" cy="484428"/>
+              </a:xfrm>
+              <a:prstGeom prst="rect">
+                <a:avLst/>
+              </a:prstGeom>
+            </p:spPr>
+          </p:pic>
+          <p:sp>
+            <p:nvSpPr>
+              <p:cNvPr id="13" name="Rectángulo 12"/>
+              <p:cNvSpPr/>
+              <p:nvPr/>
+            </p:nvSpPr>
+            <p:spPr>
+              <a:xfrm>
+                <a:off x="4417329" y="598113"/>
+                <a:ext cx="628697" cy="523220"/>
+              </a:xfrm>
+              <a:prstGeom prst="rect">
+                <a:avLst/>
+              </a:prstGeom>
+              <a:noFill/>
+            </p:spPr>
+            <p:txBody>
+              <a:bodyPr wrap="none" lIns="91440" tIns="45720" rIns="91440" bIns="45720">
+                <a:spAutoFit/>
+              </a:bodyPr>
+              <a:lstStyle/>
+              <a:p>
+                <a:pPr algn="ctr"/>
+                <a:r>
+                  <a:rPr lang="es-ES" sz="2800" b="0" cap="none" spc="0" dirty="0" smtClean="0">
+                    <a:ln w="0"/>
+                    <a:solidFill>
+                      <a:schemeClr val="tx1"/>
+                    </a:solidFill>
+                    <a:effectLst>
+                      <a:outerShdw blurRad="38100" dist="19050" dir="2700000" algn="tl" rotWithShape="0">
+                        <a:schemeClr val="dk1">
+                          <a:alpha val="40000"/>
+                        </a:schemeClr>
+                      </a:outerShdw>
+                    </a:effectLst>
+                  </a:rPr>
+                  <a:t>= 1</a:t>
+                </a:r>
+                <a:endParaRPr lang="es-ES" sz="2800" b="0" cap="none" spc="0" dirty="0">
+                  <a:ln w="0"/>
+                  <a:solidFill>
+                    <a:schemeClr val="tx1"/>
+                  </a:solidFill>
+                  <a:effectLst>
+                    <a:outerShdw blurRad="38100" dist="19050" dir="2700000" algn="tl" rotWithShape="0">
+                      <a:schemeClr val="dk1">
+                        <a:alpha val="40000"/>
+                      </a:schemeClr>
+                    </a:outerShdw>
+                  </a:effectLst>
+                </a:endParaRPr>
+              </a:p>
+            </p:txBody>
+          </p:sp>
+        </p:grpSp>
+        <p:grpSp>
+          <p:nvGrpSpPr>
+            <p:cNvPr id="15" name="Grupo 14"/>
+            <p:cNvGrpSpPr/>
+            <p:nvPr/>
+          </p:nvGrpSpPr>
+          <p:grpSpPr>
+            <a:xfrm>
+              <a:off x="5219395" y="598113"/>
+              <a:ext cx="1252517" cy="523220"/>
+              <a:chOff x="5635313" y="578717"/>
+              <a:chExt cx="1252517" cy="523220"/>
+            </a:xfrm>
+          </p:grpSpPr>
+          <p:pic>
+            <p:nvPicPr>
+              <p:cNvPr id="4" name="Imagen 3"/>
+              <p:cNvPicPr>
+                <a:picLocks noChangeAspect="1"/>
+              </p:cNvPicPr>
+              <p:nvPr/>
+            </p:nvPicPr>
+            <p:blipFill>
+              <a:blip r:embed="rId9" cstate="print">
+                <a:extLst>
+                  <a:ext uri="{28A0092B-C50C-407E-A947-70E740481C1C}">
+                    <a14:useLocalDpi xmlns:a14="http://schemas.microsoft.com/office/drawing/2010/main" val="0"/>
+                  </a:ext>
+                </a:extLst>
+              </a:blip>
+              <a:stretch>
+                <a:fillRect/>
+              </a:stretch>
+            </p:blipFill>
+            <p:spPr>
+              <a:xfrm>
+                <a:off x="5635313" y="617509"/>
+                <a:ext cx="623819" cy="484428"/>
+              </a:xfrm>
+              <a:prstGeom prst="rect">
+                <a:avLst/>
+              </a:prstGeom>
+            </p:spPr>
+          </p:pic>
+          <p:sp>
+            <p:nvSpPr>
+              <p:cNvPr id="16" name="Rectángulo 15"/>
+              <p:cNvSpPr/>
+              <p:nvPr/>
+            </p:nvSpPr>
+            <p:spPr>
+              <a:xfrm>
+                <a:off x="6259132" y="578717"/>
+                <a:ext cx="628698" cy="523220"/>
+              </a:xfrm>
+              <a:prstGeom prst="rect">
+                <a:avLst/>
+              </a:prstGeom>
+              <a:noFill/>
+            </p:spPr>
+            <p:txBody>
+              <a:bodyPr wrap="none" lIns="91440" tIns="45720" rIns="91440" bIns="45720">
+                <a:spAutoFit/>
+              </a:bodyPr>
+              <a:lstStyle/>
+              <a:p>
+                <a:pPr algn="ctr"/>
+                <a:r>
+                  <a:rPr lang="es-ES" sz="2800" b="0" cap="none" spc="0" dirty="0" smtClean="0">
+                    <a:ln w="0"/>
+                    <a:solidFill>
+                      <a:schemeClr val="tx1"/>
+                    </a:solidFill>
+                    <a:effectLst>
+                      <a:outerShdw blurRad="38100" dist="19050" dir="2700000" algn="tl" rotWithShape="0">
+                        <a:schemeClr val="dk1">
+                          <a:alpha val="40000"/>
+                        </a:schemeClr>
+                      </a:outerShdw>
+                    </a:effectLst>
+                  </a:rPr>
+                  <a:t>= 5</a:t>
+                </a:r>
+                <a:endParaRPr lang="es-ES" sz="2800" b="0" cap="none" spc="0" dirty="0">
+                  <a:ln w="0"/>
+                  <a:solidFill>
+                    <a:schemeClr val="tx1"/>
+                  </a:solidFill>
+                  <a:effectLst>
+                    <a:outerShdw blurRad="38100" dist="19050" dir="2700000" algn="tl" rotWithShape="0">
+                      <a:schemeClr val="dk1">
+                        <a:alpha val="40000"/>
+                      </a:schemeClr>
+                    </a:outerShdw>
+                  </a:effectLst>
+                </a:endParaRPr>
+              </a:p>
+            </p:txBody>
+          </p:sp>
+        </p:grpSp>
+        <p:grpSp>
+          <p:nvGrpSpPr>
+            <p:cNvPr id="18" name="Grupo 17"/>
+            <p:cNvGrpSpPr/>
+            <p:nvPr/>
+          </p:nvGrpSpPr>
+          <p:grpSpPr>
+            <a:xfrm>
+              <a:off x="6711200" y="578717"/>
+              <a:ext cx="1166929" cy="523220"/>
+              <a:chOff x="7301824" y="578717"/>
+              <a:chExt cx="1166929" cy="523220"/>
+            </a:xfrm>
+          </p:grpSpPr>
+          <p:pic>
+            <p:nvPicPr>
+              <p:cNvPr id="2" name="Imagen 1"/>
+              <p:cNvPicPr>
+                <a:picLocks noChangeAspect="1"/>
+              </p:cNvPicPr>
+              <p:nvPr/>
+            </p:nvPicPr>
+            <p:blipFill>
+              <a:blip r:embed="rId10" cstate="print">
+                <a:extLst>
+                  <a:ext uri="{28A0092B-C50C-407E-A947-70E740481C1C}">
+                    <a14:useLocalDpi xmlns:a14="http://schemas.microsoft.com/office/drawing/2010/main" val="0"/>
+                  </a:ext>
+                </a:extLst>
+              </a:blip>
+              <a:stretch>
+                <a:fillRect/>
+              </a:stretch>
+            </p:blipFill>
+            <p:spPr>
+              <a:xfrm>
+                <a:off x="7301824" y="617509"/>
+                <a:ext cx="355488" cy="484428"/>
+              </a:xfrm>
+              <a:prstGeom prst="rect">
+                <a:avLst/>
+              </a:prstGeom>
+            </p:spPr>
+          </p:pic>
+          <p:sp>
+            <p:nvSpPr>
+              <p:cNvPr id="17" name="Rectángulo 16"/>
+              <p:cNvSpPr/>
+              <p:nvPr/>
+            </p:nvSpPr>
+            <p:spPr>
+              <a:xfrm>
+                <a:off x="7657312" y="578717"/>
+                <a:ext cx="811441" cy="523220"/>
+              </a:xfrm>
+              <a:prstGeom prst="rect">
+                <a:avLst/>
+              </a:prstGeom>
+              <a:noFill/>
+            </p:spPr>
+            <p:txBody>
+              <a:bodyPr wrap="none" lIns="91440" tIns="45720" rIns="91440" bIns="45720">
+                <a:spAutoFit/>
+              </a:bodyPr>
+              <a:lstStyle/>
+              <a:p>
+                <a:pPr algn="ctr"/>
+                <a:r>
+                  <a:rPr lang="es-ES" sz="2800" b="0" cap="none" spc="0" dirty="0" smtClean="0">
+                    <a:ln w="0"/>
+                    <a:solidFill>
+                      <a:schemeClr val="tx1"/>
+                    </a:solidFill>
+                    <a:effectLst>
+                      <a:outerShdw blurRad="38100" dist="19050" dir="2700000" algn="tl" rotWithShape="0">
+                        <a:schemeClr val="dk1">
+                          <a:alpha val="40000"/>
+                        </a:schemeClr>
+                      </a:outerShdw>
+                    </a:effectLst>
+                  </a:rPr>
+                  <a:t>= 10</a:t>
+                </a:r>
+                <a:endParaRPr lang="es-ES" sz="2800" b="0" cap="none" spc="0" dirty="0">
+                  <a:ln w="0"/>
+                  <a:solidFill>
+                    <a:schemeClr val="tx1"/>
+                  </a:solidFill>
+                  <a:effectLst>
+                    <a:outerShdw blurRad="38100" dist="19050" dir="2700000" algn="tl" rotWithShape="0">
+                      <a:schemeClr val="dk1">
+                        <a:alpha val="40000"/>
+                      </a:schemeClr>
+                    </a:outerShdw>
+                  </a:effectLst>
+                </a:endParaRPr>
+              </a:p>
+            </p:txBody>
+          </p:sp>
+        </p:grpSp>
+      </p:grpSp>
     </p:spTree>
     <p:extLst>
       <p:ext uri="{BB962C8B-B14F-4D97-AF65-F5344CB8AC3E}">

</xml_diff>

<commit_message>
Con el player de Diego Pastor
</commit_message>
<xml_diff>
--- a/images/tacoPresentation.pptx
+++ b/images/tacoPresentation.pptx
@@ -243,7 +243,7 @@
           <a:p>
             <a:fld id="{63FAAA8C-C4B7-46F2-85D6-06B7FA52F59C}" type="datetimeFigureOut">
               <a:rPr lang="es-MX" smtClean="0"/>
-              <a:t>27/08/2015</a:t>
+              <a:t>08/09/2015</a:t>
             </a:fld>
             <a:endParaRPr lang="es-MX"/>
           </a:p>
@@ -413,7 +413,7 @@
           <a:p>
             <a:fld id="{63FAAA8C-C4B7-46F2-85D6-06B7FA52F59C}" type="datetimeFigureOut">
               <a:rPr lang="es-MX" smtClean="0"/>
-              <a:t>27/08/2015</a:t>
+              <a:t>08/09/2015</a:t>
             </a:fld>
             <a:endParaRPr lang="es-MX"/>
           </a:p>
@@ -593,7 +593,7 @@
           <a:p>
             <a:fld id="{63FAAA8C-C4B7-46F2-85D6-06B7FA52F59C}" type="datetimeFigureOut">
               <a:rPr lang="es-MX" smtClean="0"/>
-              <a:t>27/08/2015</a:t>
+              <a:t>08/09/2015</a:t>
             </a:fld>
             <a:endParaRPr lang="es-MX"/>
           </a:p>
@@ -763,7 +763,7 @@
           <a:p>
             <a:fld id="{63FAAA8C-C4B7-46F2-85D6-06B7FA52F59C}" type="datetimeFigureOut">
               <a:rPr lang="es-MX" smtClean="0"/>
-              <a:t>27/08/2015</a:t>
+              <a:t>08/09/2015</a:t>
             </a:fld>
             <a:endParaRPr lang="es-MX"/>
           </a:p>
@@ -1009,7 +1009,7 @@
           <a:p>
             <a:fld id="{63FAAA8C-C4B7-46F2-85D6-06B7FA52F59C}" type="datetimeFigureOut">
               <a:rPr lang="es-MX" smtClean="0"/>
-              <a:t>27/08/2015</a:t>
+              <a:t>08/09/2015</a:t>
             </a:fld>
             <a:endParaRPr lang="es-MX"/>
           </a:p>
@@ -1241,7 +1241,7 @@
           <a:p>
             <a:fld id="{63FAAA8C-C4B7-46F2-85D6-06B7FA52F59C}" type="datetimeFigureOut">
               <a:rPr lang="es-MX" smtClean="0"/>
-              <a:t>27/08/2015</a:t>
+              <a:t>08/09/2015</a:t>
             </a:fld>
             <a:endParaRPr lang="es-MX"/>
           </a:p>
@@ -1608,7 +1608,7 @@
           <a:p>
             <a:fld id="{63FAAA8C-C4B7-46F2-85D6-06B7FA52F59C}" type="datetimeFigureOut">
               <a:rPr lang="es-MX" smtClean="0"/>
-              <a:t>27/08/2015</a:t>
+              <a:t>08/09/2015</a:t>
             </a:fld>
             <a:endParaRPr lang="es-MX"/>
           </a:p>
@@ -1726,7 +1726,7 @@
           <a:p>
             <a:fld id="{63FAAA8C-C4B7-46F2-85D6-06B7FA52F59C}" type="datetimeFigureOut">
               <a:rPr lang="es-MX" smtClean="0"/>
-              <a:t>27/08/2015</a:t>
+              <a:t>08/09/2015</a:t>
             </a:fld>
             <a:endParaRPr lang="es-MX"/>
           </a:p>
@@ -1821,7 +1821,7 @@
           <a:p>
             <a:fld id="{63FAAA8C-C4B7-46F2-85D6-06B7FA52F59C}" type="datetimeFigureOut">
               <a:rPr lang="es-MX" smtClean="0"/>
-              <a:t>27/08/2015</a:t>
+              <a:t>08/09/2015</a:t>
             </a:fld>
             <a:endParaRPr lang="es-MX"/>
           </a:p>
@@ -2098,7 +2098,7 @@
           <a:p>
             <a:fld id="{63FAAA8C-C4B7-46F2-85D6-06B7FA52F59C}" type="datetimeFigureOut">
               <a:rPr lang="es-MX" smtClean="0"/>
-              <a:t>27/08/2015</a:t>
+              <a:t>08/09/2015</a:t>
             </a:fld>
             <a:endParaRPr lang="es-MX"/>
           </a:p>
@@ -2351,7 +2351,7 @@
           <a:p>
             <a:fld id="{63FAAA8C-C4B7-46F2-85D6-06B7FA52F59C}" type="datetimeFigureOut">
               <a:rPr lang="es-MX" smtClean="0"/>
-              <a:t>27/08/2015</a:t>
+              <a:t>08/09/2015</a:t>
             </a:fld>
             <a:endParaRPr lang="es-MX"/>
           </a:p>
@@ -2564,7 +2564,7 @@
           <a:p>
             <a:fld id="{63FAAA8C-C4B7-46F2-85D6-06B7FA52F59C}" type="datetimeFigureOut">
               <a:rPr lang="es-MX" smtClean="0"/>
-              <a:t>27/08/2015</a:t>
+              <a:t>08/09/2015</a:t>
             </a:fld>
             <a:endParaRPr lang="es-MX"/>
           </a:p>
@@ -3552,6 +3552,35 @@
           </p:sp>
         </p:grpSp>
       </p:grpSp>
+      <p:pic>
+        <p:nvPicPr>
+          <p:cNvPr id="19" name="Imagen 18"/>
+          <p:cNvPicPr>
+            <a:picLocks noChangeAspect="1"/>
+          </p:cNvPicPr>
+          <p:nvPr/>
+        </p:nvPicPr>
+        <p:blipFill rotWithShape="1">
+          <a:blip r:embed="rId11">
+            <a:extLst>
+              <a:ext uri="{28A0092B-C50C-407E-A947-70E740481C1C}">
+                <a14:useLocalDpi xmlns:a14="http://schemas.microsoft.com/office/drawing/2010/main" val="0"/>
+              </a:ext>
+            </a:extLst>
+          </a:blip>
+          <a:srcRect l="24873" t="25915" r="27128" b="26761"/>
+          <a:stretch/>
+        </p:blipFill>
+        <p:spPr>
+          <a:xfrm>
+            <a:off x="2345009" y="4370565"/>
+            <a:ext cx="1387542" cy="1368000"/>
+          </a:xfrm>
+          <a:prstGeom prst="rect">
+            <a:avLst/>
+          </a:prstGeom>
+        </p:spPr>
+      </p:pic>
     </p:spTree>
     <p:extLst>
       <p:ext uri="{BB962C8B-B14F-4D97-AF65-F5344CB8AC3E}">

</xml_diff>